<commit_message>
More simulation comparisons show results very close to ngspice, so I'm moving on to subthreshold current.
</commit_message>
<xml_diff>
--- a/Milestones/Milestone3Presentation.pptx
+++ b/Milestones/Milestone3Presentation.pptx
@@ -12493,7 +12493,7 @@
           <a:p>
             <a:r>
               <a:rPr lang="en-US" dirty="0"/>
-              <a:t>Milestone 2</a:t>
+              <a:t>Milestone 3</a:t>
             </a:r>
           </a:p>
           <a:p>
@@ -12556,9 +12556,10 @@
           <a:lstStyle/>
           <a:p>
             <a:r>
-              <a:rPr lang="en-US" dirty="0"/>
-              <a:t>Progress Since Milestone 1:</a:t>
+              <a:rPr lang="en-US"/>
+              <a:t>Progress Since Milestone 2:</a:t>
             </a:r>
+            <a:endParaRPr lang="en-US" dirty="0"/>
           </a:p>
         </p:txBody>
       </p:sp>
@@ -12581,170 +12582,89 @@
         <p:spPr/>
         <p:txBody>
           <a:bodyPr>
-            <a:normAutofit/>
+            <a:normAutofit fontScale="70000" lnSpcReduction="20000"/>
           </a:bodyPr>
           <a:lstStyle/>
           <a:p>
             <a:r>
-              <a:rPr lang="en-US" sz="1200" dirty="0"/>
-              <a:t>Code cleanup: overhaul on how we handle circuit elements</a:t>
+              <a:rPr lang="en-US" dirty="0"/>
+              <a:t>DC Sweep Analysis</a:t>
             </a:r>
           </a:p>
           <a:p>
             <a:pPr lvl="1"/>
             <a:r>
-              <a:rPr lang="en-US" sz="1200" dirty="0"/>
-              <a:t>Instead of separate structs and lists for each type of element, all passives are the same Element with node and parameter arrays (instead of hardcoding how many they have)</a:t>
+              <a:rPr lang="en-US" dirty="0"/>
+              <a:t>Increment an element parameter over a range of values &amp; save operating point data for each simulated value</a:t>
             </a:r>
           </a:p>
           <a:p>
-            <a:pPr lvl="2"/>
             <a:r>
-              <a:rPr lang="en-US" sz="1200" dirty="0"/>
-              <a:t>Other than voltage sources, all passives can be stored on the same list (because VDC needs to be applied last to matrices for reasons described below</a:t>
+              <a:rPr lang="en-US" dirty="0"/>
+              <a:t>Transient Analysis</a:t>
             </a:r>
           </a:p>
           <a:p>
             <a:pPr lvl="1"/>
             <a:r>
-              <a:rPr lang="en-US" sz="1200" dirty="0"/>
-              <a:t>Will need further modification to properly port netlist to GPU (currently using </a:t>
+              <a:rPr lang="en-US" dirty="0"/>
+              <a:t>Increment over timesteps</a:t>
+            </a:r>
+          </a:p>
+          <a:p>
+            <a:pPr lvl="1"/>
+            <a:r>
+              <a:rPr lang="en-US" dirty="0"/>
+              <a:t>Approximate linear model of capacitances using backwards Euler method</a:t>
+            </a:r>
+          </a:p>
+          <a:p>
+            <a:pPr lvl="1"/>
+            <a:r>
+              <a:rPr lang="en-US" dirty="0"/>
+              <a:t>Added transistor parasitic capacitances and discrete capacitor modelling</a:t>
+            </a:r>
+          </a:p>
+          <a:p>
+            <a:r>
+              <a:rPr lang="en-US" dirty="0"/>
+              <a:t>Transistor model file parsing</a:t>
+            </a:r>
+          </a:p>
+          <a:p>
+            <a:pPr lvl="1"/>
+            <a:r>
+              <a:rPr lang="en-US" dirty="0"/>
+              <a:t>Potential to create higher level transistor simulation model</a:t>
+            </a:r>
+          </a:p>
+          <a:p>
+            <a:pPr lvl="1"/>
+            <a:r>
+              <a:rPr lang="en-US" dirty="0"/>
+              <a:t>Can use arbitrary input technology model</a:t>
+            </a:r>
+          </a:p>
+          <a:p>
+            <a:r>
+              <a:rPr lang="en-US" dirty="0"/>
+              <a:t>Output to CSV file – a step towards being useful</a:t>
+            </a:r>
+          </a:p>
+          <a:p>
+            <a:pPr lvl="1"/>
+            <a:r>
+              <a:rPr lang="en-US" dirty="0"/>
+              <a:t>Easy  to plot output data in Excel or </a:t>
             </a:r>
             <a:r>
-              <a:rPr lang="en-US" sz="1200" dirty="0" err="1"/>
-              <a:t>std</a:t>
+              <a:rPr lang="en-US" dirty="0" err="1"/>
+              <a:t>Matlab</a:t>
             </a:r>
-            <a:r>
-              <a:rPr lang="en-US" sz="1200" dirty="0"/>
-              <a:t>::vectors for dynamic arrays)</a:t>
-            </a:r>
-          </a:p>
-          <a:p>
-            <a:r>
-              <a:rPr lang="en-US" sz="1200" dirty="0"/>
-              <a:t>More edge case testing to locate and correct bugs</a:t>
-            </a:r>
-          </a:p>
-          <a:p>
-            <a:pPr lvl="1"/>
-            <a:r>
-              <a:rPr lang="en-US" sz="1200" dirty="0"/>
-              <a:t>Located a problem with VDC modelling (problem with conversion to I and G when neither node grounded)</a:t>
-            </a:r>
-          </a:p>
-          <a:p>
-            <a:pPr lvl="2"/>
-            <a:r>
-              <a:rPr lang="en-US" sz="1200" dirty="0"/>
-              <a:t>Before: Used the fact that the currents flowing out of both positive and negative node are equal to generate G and I matrix entries</a:t>
-            </a:r>
-          </a:p>
-          <a:p>
-            <a:pPr lvl="2"/>
-            <a:r>
-              <a:rPr lang="en-US" sz="1200" dirty="0"/>
-              <a:t>Problem: Even though </a:t>
-            </a:r>
-            <a:r>
-              <a:rPr lang="en-US" sz="1200" dirty="0" err="1"/>
-              <a:t>Vp</a:t>
-            </a:r>
-            <a:r>
-              <a:rPr lang="en-US" sz="1200" dirty="0"/>
-              <a:t> = </a:t>
-            </a:r>
-            <a:r>
-              <a:rPr lang="en-US" sz="1200" dirty="0" err="1"/>
-              <a:t>Vn</a:t>
-            </a:r>
-            <a:r>
-              <a:rPr lang="en-US" sz="1200" dirty="0"/>
-              <a:t> + Vdc used to replace on of the voltages in one of the equations to assert Vdc dependence, still both voltages dependent on G seen at each node</a:t>
-            </a:r>
-          </a:p>
-          <a:p>
-            <a:pPr lvl="2"/>
-            <a:r>
-              <a:rPr lang="en-US" sz="1200" dirty="0"/>
-              <a:t>Solution: seems really obvious, but </a:t>
-            </a:r>
-            <a:r>
-              <a:rPr lang="en-US" sz="1200" dirty="0" err="1"/>
-              <a:t>Vp</a:t>
-            </a:r>
-            <a:r>
-              <a:rPr lang="en-US" sz="1200" dirty="0"/>
-              <a:t> – </a:t>
-            </a:r>
-            <a:r>
-              <a:rPr lang="en-US" sz="1200" dirty="0" err="1"/>
-              <a:t>Vn</a:t>
-            </a:r>
-            <a:r>
-              <a:rPr lang="en-US" sz="1200" dirty="0"/>
-              <a:t> = Vdc, =&gt; </a:t>
-            </a:r>
-            <a:r>
-              <a:rPr lang="en-US" sz="1200" dirty="0" err="1"/>
-              <a:t>Vp</a:t>
-            </a:r>
-            <a:r>
-              <a:rPr lang="en-US" sz="1200" dirty="0"/>
-              <a:t>(</a:t>
-            </a:r>
-            <a:r>
-              <a:rPr lang="en-US" sz="1200" dirty="0" err="1"/>
-              <a:t>Gx</a:t>
-            </a:r>
-            <a:r>
-              <a:rPr lang="en-US" sz="1200" dirty="0"/>
-              <a:t>) – </a:t>
-            </a:r>
-            <a:r>
-              <a:rPr lang="en-US" sz="1200" dirty="0" err="1"/>
-              <a:t>Vn</a:t>
-            </a:r>
-            <a:r>
-              <a:rPr lang="en-US" sz="1200" dirty="0"/>
-              <a:t>(</a:t>
-            </a:r>
-            <a:r>
-              <a:rPr lang="en-US" sz="1200" dirty="0" err="1"/>
-              <a:t>Gx</a:t>
-            </a:r>
-            <a:r>
-              <a:rPr lang="en-US" sz="1200" dirty="0"/>
-              <a:t>) = Vdc(</a:t>
-            </a:r>
-            <a:r>
-              <a:rPr lang="en-US" sz="1200" dirty="0" err="1"/>
-              <a:t>Gx</a:t>
-            </a:r>
-            <a:r>
-              <a:rPr lang="en-US" sz="1200" dirty="0"/>
-              <a:t>) =&gt; divide by </a:t>
-            </a:r>
-            <a:r>
-              <a:rPr lang="en-US" sz="1200" dirty="0" err="1"/>
-              <a:t>Gx</a:t>
-            </a:r>
-            <a:r>
-              <a:rPr lang="en-US" sz="1200" dirty="0"/>
-              <a:t>. So, I use the previous method to populate the matrix for </a:t>
-            </a:r>
-            <a:r>
-              <a:rPr lang="en-US" sz="1200" dirty="0" err="1"/>
-              <a:t>Vn</a:t>
-            </a:r>
-            <a:r>
-              <a:rPr lang="en-US" sz="1200" dirty="0"/>
-              <a:t> but this new equation for </a:t>
-            </a:r>
-            <a:r>
-              <a:rPr lang="en-US" sz="1200" dirty="0" err="1"/>
-              <a:t>Vp</a:t>
-            </a:r>
-            <a:endParaRPr lang="en-US" sz="1200" dirty="0"/>
+            <a:endParaRPr lang="en-US" dirty="0"/>
+          </a:p>
+          <a:p>
+            <a:endParaRPr lang="en-US" dirty="0"/>
           </a:p>
         </p:txBody>
       </p:sp>
@@ -12778,42 +12698,6 @@
           <a:chExt cx="0" cy="0"/>
         </a:xfrm>
       </p:grpSpPr>
-      <p:pic>
-        <p:nvPicPr>
-          <p:cNvPr id="3" name="Picture 2">
-            <a:extLst>
-              <a:ext uri="{FF2B5EF4-FFF2-40B4-BE49-F238E27FC236}">
-                <a16:creationId xmlns:a16="http://schemas.microsoft.com/office/drawing/2014/main" id="{116977C1-CBFB-4E5D-B781-B43DFA57E987}"/>
-              </a:ext>
-            </a:extLst>
-          </p:cNvPr>
-          <p:cNvPicPr>
-            <a:picLocks noChangeAspect="1"/>
-          </p:cNvPicPr>
-          <p:nvPr/>
-        </p:nvPicPr>
-        <p:blipFill>
-          <a:blip r:embed="rId2">
-            <a:extLst>
-              <a:ext uri="{28A0092B-C50C-407E-A947-70E740481C1C}">
-                <a14:useLocalDpi xmlns:a14="http://schemas.microsoft.com/office/drawing/2010/main" val="0"/>
-              </a:ext>
-            </a:extLst>
-          </a:blip>
-          <a:stretch>
-            <a:fillRect/>
-          </a:stretch>
-        </p:blipFill>
-        <p:spPr>
-          <a:xfrm>
-            <a:off x="1047312" y="1379042"/>
-            <a:ext cx="10097375" cy="4099915"/>
-          </a:xfrm>
-          <a:prstGeom prst="rect">
-            <a:avLst/>
-          </a:prstGeom>
-        </p:spPr>
-      </p:pic>
     </p:spTree>
     <p:extLst>
       <p:ext uri="{BB962C8B-B14F-4D97-AF65-F5344CB8AC3E}">
@@ -12865,10 +12749,7 @@
           <a:bodyPr/>
           <a:lstStyle/>
           <a:p>
-            <a:r>
-              <a:rPr lang="en-US" dirty="0"/>
-              <a:t>Progress Since Milestone 1: Transistors</a:t>
-            </a:r>
+            <a:endParaRPr lang="en-US" dirty="0"/>
           </a:p>
         </p:txBody>
       </p:sp>
@@ -12891,88 +12772,11 @@
         <p:spPr/>
         <p:txBody>
           <a:bodyPr>
-            <a:normAutofit fontScale="62500" lnSpcReduction="20000"/>
+            <a:normAutofit/>
           </a:bodyPr>
           <a:lstStyle/>
           <a:p>
-            <a:r>
-              <a:rPr lang="en-US" dirty="0"/>
-              <a:t>Added transistor parsing, not including any extra geometry/layout parameters</a:t>
-            </a:r>
-          </a:p>
-          <a:p>
-            <a:r>
-              <a:rPr lang="en-US" dirty="0"/>
-              <a:t>Currently use a default hard-coded MOSFET models, need to add model parsing</a:t>
-            </a:r>
-          </a:p>
-          <a:p>
-            <a:r>
-              <a:rPr lang="en-US" dirty="0"/>
-              <a:t>Transistor linearization to G and I elements</a:t>
-            </a:r>
-          </a:p>
-          <a:p>
-            <a:r>
-              <a:rPr lang="en-US" dirty="0"/>
-              <a:t>Added channel-length modulation parameter</a:t>
-            </a:r>
-          </a:p>
-          <a:p>
-            <a:pPr lvl="1"/>
-            <a:r>
-              <a:rPr lang="en-US" dirty="0"/>
-              <a:t>Adds dependence on drain-source voltage in saturation</a:t>
-            </a:r>
-          </a:p>
-          <a:p>
-            <a:pPr lvl="1"/>
-            <a:r>
-              <a:rPr lang="en-US" dirty="0"/>
-              <a:t>Otherwise, for example for a simple inverter w/ </a:t>
-            </a:r>
-            <a:r>
-              <a:rPr lang="en-US" dirty="0" err="1"/>
-              <a:t>Vdd</a:t>
-            </a:r>
-            <a:r>
-              <a:rPr lang="en-US" dirty="0"/>
-              <a:t>/2 input there are 3 different solutions possible and it converges to one of those, not necessarily the one we want</a:t>
-            </a:r>
-          </a:p>
-          <a:p>
-            <a:r>
-              <a:rPr lang="en-US" dirty="0"/>
-              <a:t>Solution of circuits including transistors by:</a:t>
-            </a:r>
-          </a:p>
-          <a:p>
-            <a:pPr lvl="1"/>
-            <a:r>
-              <a:rPr lang="en-US" dirty="0"/>
-              <a:t>Using previous solution as “Guess” voltages to linearize model</a:t>
-            </a:r>
-          </a:p>
-          <a:p>
-            <a:pPr lvl="1"/>
-            <a:r>
-              <a:rPr lang="en-US" dirty="0"/>
-              <a:t>Iterating solving circuit until new solution and previous guess converge to within some absolute tolerance (currently 1µV)</a:t>
-            </a:r>
-          </a:p>
-          <a:p>
-            <a:pPr lvl="1"/>
-            <a:r>
-              <a:rPr lang="en-US" dirty="0"/>
-              <a:t>This implicitly performs Newton-Raphson method</a:t>
-            </a:r>
-          </a:p>
-          <a:p>
-            <a:pPr lvl="1"/>
-            <a:r>
-              <a:rPr lang="en-US" dirty="0"/>
-              <a:t>Currently very serial loop method, only matrix solving on GPU</a:t>
-            </a:r>
+            <a:endParaRPr lang="en-US" dirty="0"/>
           </a:p>
         </p:txBody>
       </p:sp>
@@ -13006,42 +12810,6 @@
           <a:chExt cx="0" cy="0"/>
         </a:xfrm>
       </p:grpSpPr>
-      <p:pic>
-        <p:nvPicPr>
-          <p:cNvPr id="11" name="Picture 10">
-            <a:extLst>
-              <a:ext uri="{FF2B5EF4-FFF2-40B4-BE49-F238E27FC236}">
-                <a16:creationId xmlns:a16="http://schemas.microsoft.com/office/drawing/2014/main" id="{DDA810C8-CB86-4AA5-8524-289429FD5457}"/>
-              </a:ext>
-            </a:extLst>
-          </p:cNvPr>
-          <p:cNvPicPr>
-            <a:picLocks noChangeAspect="1"/>
-          </p:cNvPicPr>
-          <p:nvPr/>
-        </p:nvPicPr>
-        <p:blipFill>
-          <a:blip r:embed="rId2">
-            <a:extLst>
-              <a:ext uri="{28A0092B-C50C-407E-A947-70E740481C1C}">
-                <a14:useLocalDpi xmlns:a14="http://schemas.microsoft.com/office/drawing/2010/main" val="0"/>
-              </a:ext>
-            </a:extLst>
-          </a:blip>
-          <a:stretch>
-            <a:fillRect/>
-          </a:stretch>
-        </p:blipFill>
-        <p:spPr>
-          <a:xfrm>
-            <a:off x="1166556" y="846608"/>
-            <a:ext cx="9858887" cy="5164784"/>
-          </a:xfrm>
-          <a:prstGeom prst="rect">
-            <a:avLst/>
-          </a:prstGeom>
-        </p:spPr>
-      </p:pic>
     </p:spTree>
     <p:extLst>
       <p:ext uri="{BB962C8B-B14F-4D97-AF65-F5344CB8AC3E}">
@@ -13093,10 +12861,7 @@
           <a:bodyPr/>
           <a:lstStyle/>
           <a:p>
-            <a:r>
-              <a:rPr lang="en-US" dirty="0"/>
-              <a:t>Currently Working ON:</a:t>
-            </a:r>
+            <a:endParaRPr lang="en-US" dirty="0"/>
           </a:p>
         </p:txBody>
       </p:sp>
@@ -13119,84 +12884,9 @@
         <p:spPr/>
         <p:txBody>
           <a:bodyPr>
-            <a:normAutofit fontScale="85000" lnSpcReduction="20000"/>
+            <a:normAutofit/>
           </a:bodyPr>
           <a:lstStyle/>
-          <a:p>
-            <a:r>
-              <a:rPr lang="en-US" dirty="0"/>
-              <a:t>Model parsing and multiline content parsing</a:t>
-            </a:r>
-          </a:p>
-          <a:p>
-            <a:pPr lvl="1"/>
-            <a:r>
-              <a:rPr lang="en-US" dirty="0"/>
-              <a:t>Models generally specified in separate .</a:t>
-            </a:r>
-            <a:r>
-              <a:rPr lang="en-US" dirty="0" err="1"/>
-              <a:t>incude</a:t>
-            </a:r>
-            <a:r>
-              <a:rPr lang="en-US" dirty="0"/>
-              <a:t> files, but can be in netlist file, .model line</a:t>
-            </a:r>
-          </a:p>
-          <a:p>
-            <a:pPr lvl="1"/>
-            <a:r>
-              <a:rPr lang="en-US" dirty="0"/>
-              <a:t>Parameters spilling into multiple lines start new line with ‘+’ character, need to look ahead to next line</a:t>
-            </a:r>
-          </a:p>
-          <a:p>
-            <a:r>
-              <a:rPr lang="en-US" dirty="0"/>
-              <a:t>DC Sweep – already have idea of how to setup</a:t>
-            </a:r>
-          </a:p>
-          <a:p>
-            <a:pPr lvl="1"/>
-            <a:r>
-              <a:rPr lang="en-US" dirty="0"/>
-              <a:t>Find swept element, save original parameter value, overwrite with start value</a:t>
-            </a:r>
-          </a:p>
-          <a:p>
-            <a:pPr lvl="1"/>
-            <a:r>
-              <a:rPr lang="en-US" dirty="0"/>
-              <a:t>Solve, increment value by step size, repeat until stop value reached</a:t>
-            </a:r>
-          </a:p>
-          <a:p>
-            <a:r>
-              <a:rPr lang="en-US" dirty="0"/>
-              <a:t>Porting matrix setup to GPU:</a:t>
-            </a:r>
-          </a:p>
-          <a:p>
-            <a:pPr lvl="1"/>
-            <a:r>
-              <a:rPr lang="en-US" dirty="0"/>
-              <a:t>Parallelize by elements</a:t>
-            </a:r>
-          </a:p>
-          <a:p>
-            <a:pPr lvl="1"/>
-            <a:r>
-              <a:rPr lang="en-US" dirty="0"/>
-              <a:t>Atomics for race conditions between elements on same node</a:t>
-            </a:r>
-          </a:p>
-          <a:p>
-            <a:pPr lvl="1"/>
-            <a:r>
-              <a:rPr lang="en-US" dirty="0"/>
-              <a:t>Current issue with this is passing netlist to GPU, needs modifications</a:t>
-            </a:r>
-          </a:p>
           <a:p>
             <a:endParaRPr lang="en-US" dirty="0"/>
           </a:p>
@@ -13253,18 +12943,7 @@
           <a:bodyPr/>
           <a:lstStyle/>
           <a:p>
-            <a:r>
-              <a:rPr lang="en-US" dirty="0"/>
-              <a:t>Next </a:t>
-            </a:r>
-            <a:r>
-              <a:rPr lang="en-US" dirty="0" err="1"/>
-              <a:t>MilestonE</a:t>
-            </a:r>
-            <a:r>
-              <a:rPr lang="en-US" dirty="0"/>
-              <a:t>:</a:t>
-            </a:r>
+            <a:endParaRPr lang="en-US" dirty="0"/>
           </a:p>
         </p:txBody>
       </p:sp>
@@ -13287,52 +12966,11 @@
         <p:spPr/>
         <p:txBody>
           <a:bodyPr>
-            <a:normAutofit lnSpcReduction="10000"/>
+            <a:normAutofit/>
           </a:bodyPr>
           <a:lstStyle/>
           <a:p>
-            <a:r>
-              <a:rPr lang="en-US" dirty="0"/>
-              <a:t>Transient (Time step) Simulation</a:t>
-            </a:r>
-          </a:p>
-          <a:p>
-            <a:pPr lvl="1"/>
-            <a:r>
-              <a:rPr lang="en-US" dirty="0"/>
-              <a:t>Add in capacitors, inductors, AC sources, etc. (time-dependent elements)</a:t>
-            </a:r>
-          </a:p>
-          <a:p>
-            <a:r>
-              <a:rPr lang="en-US" dirty="0"/>
-              <a:t>More second-order effects (improved transistor modelling)</a:t>
-            </a:r>
-          </a:p>
-          <a:p>
-            <a:r>
-              <a:rPr lang="en-US" dirty="0"/>
-              <a:t>Graphical interface or data export and plotting</a:t>
-            </a:r>
-          </a:p>
-          <a:p>
-            <a:r>
-              <a:rPr lang="en-US" dirty="0"/>
-              <a:t>Performance optimizations &amp; comparison</a:t>
-            </a:r>
-          </a:p>
-          <a:p>
-            <a:r>
-              <a:rPr lang="en-US" dirty="0"/>
-              <a:t>Stream compaction of matrices (expected to be sparse in large circuits)</a:t>
-            </a:r>
-          </a:p>
-          <a:p>
-            <a:pPr lvl="1"/>
-            <a:r>
-              <a:rPr lang="en-US" dirty="0"/>
-              <a:t>For better memory usage, as ultimate goal is to be useful for VLSI</a:t>
-            </a:r>
+            <a:endParaRPr lang="en-US" dirty="0"/>
           </a:p>
         </p:txBody>
       </p:sp>

</xml_diff>

<commit_message>
Able to convert passive elements list to GPU arrays and build matrix, moving towards all on GPU
</commit_message>
<xml_diff>
--- a/Milestones/Milestone3Presentation.pptx
+++ b/Milestones/Milestone3Presentation.pptx
@@ -7,11 +7,9 @@
   <p:sldIdLst>
     <p:sldId id="256" r:id="rId2"/>
     <p:sldId id="258" r:id="rId3"/>
-    <p:sldId id="259" r:id="rId4"/>
-    <p:sldId id="257" r:id="rId5"/>
+    <p:sldId id="257" r:id="rId4"/>
+    <p:sldId id="259" r:id="rId5"/>
     <p:sldId id="263" r:id="rId6"/>
-    <p:sldId id="260" r:id="rId7"/>
-    <p:sldId id="264" r:id="rId8"/>
   </p:sldIdLst>
   <p:sldSz cx="12192000" cy="6858000"/>
   <p:notesSz cx="6858000" cy="9144000"/>
@@ -168,7 +166,7 @@
           <a:noFill/>
           <a:extLst>
             <a:ext uri="{909E8E84-426E-40dd-AFC4-6F175D3DCCD1}">
-              <a14:hiddenFill xmlns:a14="http://schemas.microsoft.com/office/drawing/2010/main" xmlns="">
+              <a14:hiddenFill xmlns="" xmlns:a14="http://schemas.microsoft.com/office/drawing/2010/main">
                 <a:solidFill>
                   <a:srgbClr val="FFFFFF"/>
                 </a:solidFill>
@@ -228,7 +226,7 @@
             </a:ln>
             <a:extLst>
               <a:ext uri="{91240B29-F687-4f45-9708-019B960494DF}">
-                <a14:hiddenLine xmlns:a14="http://schemas.microsoft.com/office/drawing/2010/main" xmlns="" w="9525">
+                <a14:hiddenLine xmlns="" xmlns:a14="http://schemas.microsoft.com/office/drawing/2010/main" w="9525">
                   <a:solidFill>
                     <a:srgbClr val="000000"/>
                   </a:solidFill>
@@ -318,7 +316,7 @@
             </a:ln>
             <a:extLst>
               <a:ext uri="{91240B29-F687-4f45-9708-019B960494DF}">
-                <a14:hiddenLine xmlns:a14="http://schemas.microsoft.com/office/drawing/2010/main" xmlns="" w="9525">
+                <a14:hiddenLine xmlns="" xmlns:a14="http://schemas.microsoft.com/office/drawing/2010/main" w="9525">
                   <a:solidFill>
                     <a:srgbClr val="000000"/>
                   </a:solidFill>
@@ -408,7 +406,7 @@
             </a:ln>
             <a:extLst>
               <a:ext uri="{91240B29-F687-4f45-9708-019B960494DF}">
-                <a14:hiddenLine xmlns:a14="http://schemas.microsoft.com/office/drawing/2010/main" xmlns="" w="9525">
+                <a14:hiddenLine xmlns="" xmlns:a14="http://schemas.microsoft.com/office/drawing/2010/main" w="9525">
                   <a:solidFill>
                     <a:srgbClr val="000000"/>
                   </a:solidFill>
@@ -442,7 +440,7 @@
             </a:ln>
             <a:extLst>
               <a:ext uri="{91240B29-F687-4f45-9708-019B960494DF}">
-                <a14:hiddenLine xmlns:a14="http://schemas.microsoft.com/office/drawing/2010/main" xmlns="" w="9525">
+                <a14:hiddenLine xmlns="" xmlns:a14="http://schemas.microsoft.com/office/drawing/2010/main" w="9525">
                   <a:solidFill>
                     <a:srgbClr val="000000"/>
                   </a:solidFill>
@@ -532,7 +530,7 @@
             </a:ln>
             <a:extLst>
               <a:ext uri="{91240B29-F687-4f45-9708-019B960494DF}">
-                <a14:hiddenLine xmlns:a14="http://schemas.microsoft.com/office/drawing/2010/main" xmlns="" w="9525">
+                <a14:hiddenLine xmlns="" xmlns:a14="http://schemas.microsoft.com/office/drawing/2010/main" w="9525">
                   <a:solidFill>
                     <a:srgbClr val="000000"/>
                   </a:solidFill>
@@ -594,7 +592,7 @@
             </a:ln>
             <a:extLst>
               <a:ext uri="{91240B29-F687-4f45-9708-019B960494DF}">
-                <a14:hiddenLine xmlns:a14="http://schemas.microsoft.com/office/drawing/2010/main" xmlns="" w="9525">
+                <a14:hiddenLine xmlns="" xmlns:a14="http://schemas.microsoft.com/office/drawing/2010/main" w="9525">
                   <a:solidFill>
                     <a:srgbClr val="000000"/>
                   </a:solidFill>
@@ -656,7 +654,7 @@
             </a:ln>
             <a:extLst>
               <a:ext uri="{91240B29-F687-4f45-9708-019B960494DF}">
-                <a14:hiddenLine xmlns:a14="http://schemas.microsoft.com/office/drawing/2010/main" xmlns="" w="9525">
+                <a14:hiddenLine xmlns="" xmlns:a14="http://schemas.microsoft.com/office/drawing/2010/main" w="9525">
                   <a:solidFill>
                     <a:srgbClr val="000000"/>
                   </a:solidFill>
@@ -746,7 +744,7 @@
             </a:ln>
             <a:extLst>
               <a:ext uri="{91240B29-F687-4f45-9708-019B960494DF}">
-                <a14:hiddenLine xmlns:a14="http://schemas.microsoft.com/office/drawing/2010/main" xmlns="" w="9525">
+                <a14:hiddenLine xmlns="" xmlns:a14="http://schemas.microsoft.com/office/drawing/2010/main" w="9525">
                   <a:solidFill>
                     <a:srgbClr val="000000"/>
                   </a:solidFill>
@@ -808,7 +806,7 @@
             </a:ln>
             <a:extLst>
               <a:ext uri="{91240B29-F687-4f45-9708-019B960494DF}">
-                <a14:hiddenLine xmlns:a14="http://schemas.microsoft.com/office/drawing/2010/main" xmlns="" w="9525">
+                <a14:hiddenLine xmlns="" xmlns:a14="http://schemas.microsoft.com/office/drawing/2010/main" w="9525">
                   <a:solidFill>
                     <a:srgbClr val="000000"/>
                   </a:solidFill>
@@ -870,7 +868,7 @@
             </a:ln>
             <a:extLst>
               <a:ext uri="{91240B29-F687-4f45-9708-019B960494DF}">
-                <a14:hiddenLine xmlns:a14="http://schemas.microsoft.com/office/drawing/2010/main" xmlns="" w="9525">
+                <a14:hiddenLine xmlns="" xmlns:a14="http://schemas.microsoft.com/office/drawing/2010/main" w="9525">
                   <a:solidFill>
                     <a:srgbClr val="000000"/>
                   </a:solidFill>
@@ -960,7 +958,7 @@
             </a:ln>
             <a:extLst>
               <a:ext uri="{91240B29-F687-4f45-9708-019B960494DF}">
-                <a14:hiddenLine xmlns:a14="http://schemas.microsoft.com/office/drawing/2010/main" xmlns="" w="9525">
+                <a14:hiddenLine xmlns="" xmlns:a14="http://schemas.microsoft.com/office/drawing/2010/main" w="9525">
                   <a:solidFill>
                     <a:srgbClr val="000000"/>
                   </a:solidFill>
@@ -1050,7 +1048,7 @@
             </a:ln>
             <a:extLst>
               <a:ext uri="{91240B29-F687-4f45-9708-019B960494DF}">
-                <a14:hiddenLine xmlns:a14="http://schemas.microsoft.com/office/drawing/2010/main" xmlns="" w="9525">
+                <a14:hiddenLine xmlns="" xmlns:a14="http://schemas.microsoft.com/office/drawing/2010/main" w="9525">
                   <a:solidFill>
                     <a:srgbClr val="000000"/>
                   </a:solidFill>
@@ -1112,7 +1110,7 @@
             </a:ln>
             <a:extLst>
               <a:ext uri="{91240B29-F687-4f45-9708-019B960494DF}">
-                <a14:hiddenLine xmlns:a14="http://schemas.microsoft.com/office/drawing/2010/main" xmlns="" w="9525">
+                <a14:hiddenLine xmlns="" xmlns:a14="http://schemas.microsoft.com/office/drawing/2010/main" w="9525">
                   <a:solidFill>
                     <a:srgbClr val="000000"/>
                   </a:solidFill>
@@ -1222,7 +1220,7 @@
             </a:ln>
             <a:extLst>
               <a:ext uri="{91240B29-F687-4f45-9708-019B960494DF}">
-                <a14:hiddenLine xmlns:a14="http://schemas.microsoft.com/office/drawing/2010/main" xmlns="" w="9525">
+                <a14:hiddenLine xmlns="" xmlns:a14="http://schemas.microsoft.com/office/drawing/2010/main" w="9525">
                   <a:solidFill>
                     <a:srgbClr val="000000"/>
                   </a:solidFill>
@@ -1284,7 +1282,7 @@
             </a:ln>
             <a:extLst>
               <a:ext uri="{91240B29-F687-4f45-9708-019B960494DF}">
-                <a14:hiddenLine xmlns:a14="http://schemas.microsoft.com/office/drawing/2010/main" xmlns="" w="9525">
+                <a14:hiddenLine xmlns="" xmlns:a14="http://schemas.microsoft.com/office/drawing/2010/main" w="9525">
                   <a:solidFill>
                     <a:srgbClr val="000000"/>
                   </a:solidFill>
@@ -1374,7 +1372,7 @@
             </a:ln>
             <a:extLst>
               <a:ext uri="{91240B29-F687-4f45-9708-019B960494DF}">
-                <a14:hiddenLine xmlns:a14="http://schemas.microsoft.com/office/drawing/2010/main" xmlns="" w="9525">
+                <a14:hiddenLine xmlns="" xmlns:a14="http://schemas.microsoft.com/office/drawing/2010/main" w="9525">
                   <a:solidFill>
                     <a:srgbClr val="000000"/>
                   </a:solidFill>
@@ -1464,7 +1462,7 @@
             </a:ln>
             <a:extLst>
               <a:ext uri="{91240B29-F687-4f45-9708-019B960494DF}">
-                <a14:hiddenLine xmlns:a14="http://schemas.microsoft.com/office/drawing/2010/main" xmlns="" w="9525">
+                <a14:hiddenLine xmlns="" xmlns:a14="http://schemas.microsoft.com/office/drawing/2010/main" w="9525">
                   <a:solidFill>
                     <a:srgbClr val="000000"/>
                   </a:solidFill>
@@ -1526,7 +1524,7 @@
             </a:ln>
             <a:extLst>
               <a:ext uri="{91240B29-F687-4f45-9708-019B960494DF}">
-                <a14:hiddenLine xmlns:a14="http://schemas.microsoft.com/office/drawing/2010/main" xmlns="" w="9525">
+                <a14:hiddenLine xmlns="" xmlns:a14="http://schemas.microsoft.com/office/drawing/2010/main" w="9525">
                   <a:solidFill>
                     <a:srgbClr val="000000"/>
                   </a:solidFill>
@@ -1616,7 +1614,7 @@
             </a:ln>
             <a:extLst>
               <a:ext uri="{91240B29-F687-4f45-9708-019B960494DF}">
-                <a14:hiddenLine xmlns:a14="http://schemas.microsoft.com/office/drawing/2010/main" xmlns="" w="9525">
+                <a14:hiddenLine xmlns="" xmlns:a14="http://schemas.microsoft.com/office/drawing/2010/main" w="9525">
                   <a:solidFill>
                     <a:srgbClr val="000000"/>
                   </a:solidFill>
@@ -1706,7 +1704,7 @@
             </a:ln>
             <a:extLst>
               <a:ext uri="{91240B29-F687-4f45-9708-019B960494DF}">
-                <a14:hiddenLine xmlns:a14="http://schemas.microsoft.com/office/drawing/2010/main" xmlns="" w="9525">
+                <a14:hiddenLine xmlns="" xmlns:a14="http://schemas.microsoft.com/office/drawing/2010/main" w="9525">
                   <a:solidFill>
                     <a:srgbClr val="000000"/>
                   </a:solidFill>
@@ -1762,7 +1760,7 @@
             </a:ln>
             <a:extLst>
               <a:ext uri="{91240B29-F687-4f45-9708-019B960494DF}">
-                <a14:hiddenLine xmlns:a14="http://schemas.microsoft.com/office/drawing/2010/main" xmlns="" w="9525">
+                <a14:hiddenLine xmlns="" xmlns:a14="http://schemas.microsoft.com/office/drawing/2010/main" w="9525">
                   <a:solidFill>
                     <a:srgbClr val="000000"/>
                   </a:solidFill>
@@ -1852,7 +1850,7 @@
             </a:ln>
             <a:extLst>
               <a:ext uri="{91240B29-F687-4f45-9708-019B960494DF}">
-                <a14:hiddenLine xmlns:a14="http://schemas.microsoft.com/office/drawing/2010/main" xmlns="" w="9525">
+                <a14:hiddenLine xmlns="" xmlns:a14="http://schemas.microsoft.com/office/drawing/2010/main" w="9525">
                   <a:solidFill>
                     <a:srgbClr val="000000"/>
                   </a:solidFill>
@@ -1908,7 +1906,7 @@
             </a:ln>
             <a:extLst>
               <a:ext uri="{91240B29-F687-4f45-9708-019B960494DF}">
-                <a14:hiddenLine xmlns:a14="http://schemas.microsoft.com/office/drawing/2010/main" xmlns="" w="9525">
+                <a14:hiddenLine xmlns="" xmlns:a14="http://schemas.microsoft.com/office/drawing/2010/main" w="9525">
                   <a:solidFill>
                     <a:srgbClr val="000000"/>
                   </a:solidFill>
@@ -1998,7 +1996,7 @@
             </a:ln>
             <a:extLst>
               <a:ext uri="{91240B29-F687-4f45-9708-019B960494DF}">
-                <a14:hiddenLine xmlns:a14="http://schemas.microsoft.com/office/drawing/2010/main" xmlns="" w="9525">
+                <a14:hiddenLine xmlns="" xmlns:a14="http://schemas.microsoft.com/office/drawing/2010/main" w="9525">
                   <a:solidFill>
                     <a:srgbClr val="000000"/>
                   </a:solidFill>
@@ -2066,7 +2064,7 @@
             </a:ln>
             <a:extLst>
               <a:ext uri="{91240B29-F687-4f45-9708-019B960494DF}">
-                <a14:hiddenLine xmlns:a14="http://schemas.microsoft.com/office/drawing/2010/main" xmlns="" w="9525">
+                <a14:hiddenLine xmlns="" xmlns:a14="http://schemas.microsoft.com/office/drawing/2010/main" w="9525">
                   <a:solidFill>
                     <a:srgbClr val="000000"/>
                   </a:solidFill>
@@ -2156,7 +2154,7 @@
             </a:ln>
             <a:extLst>
               <a:ext uri="{91240B29-F687-4f45-9708-019B960494DF}">
-                <a14:hiddenLine xmlns:a14="http://schemas.microsoft.com/office/drawing/2010/main" xmlns="" w="9525">
+                <a14:hiddenLine xmlns="" xmlns:a14="http://schemas.microsoft.com/office/drawing/2010/main" w="9525">
                   <a:solidFill>
                     <a:srgbClr val="000000"/>
                   </a:solidFill>
@@ -2224,7 +2222,7 @@
             </a:ln>
             <a:extLst>
               <a:ext uri="{91240B29-F687-4f45-9708-019B960494DF}">
-                <a14:hiddenLine xmlns:a14="http://schemas.microsoft.com/office/drawing/2010/main" xmlns="" w="9525">
+                <a14:hiddenLine xmlns="" xmlns:a14="http://schemas.microsoft.com/office/drawing/2010/main" w="9525">
                   <a:solidFill>
                     <a:srgbClr val="000000"/>
                   </a:solidFill>
@@ -2314,7 +2312,7 @@
             </a:ln>
             <a:extLst>
               <a:ext uri="{91240B29-F687-4f45-9708-019B960494DF}">
-                <a14:hiddenLine xmlns:a14="http://schemas.microsoft.com/office/drawing/2010/main" xmlns="" w="9525">
+                <a14:hiddenLine xmlns="" xmlns:a14="http://schemas.microsoft.com/office/drawing/2010/main" w="9525">
                   <a:solidFill>
                     <a:srgbClr val="000000"/>
                   </a:solidFill>
@@ -2348,7 +2346,7 @@
             </a:ln>
             <a:extLst>
               <a:ext uri="{91240B29-F687-4f45-9708-019B960494DF}">
-                <a14:hiddenLine xmlns:a14="http://schemas.microsoft.com/office/drawing/2010/main" xmlns="" w="9525">
+                <a14:hiddenLine xmlns="" xmlns:a14="http://schemas.microsoft.com/office/drawing/2010/main" w="9525">
                   <a:solidFill>
                     <a:srgbClr val="000000"/>
                   </a:solidFill>
@@ -2438,7 +2436,7 @@
             </a:ln>
             <a:extLst>
               <a:ext uri="{91240B29-F687-4f45-9708-019B960494DF}">
-                <a14:hiddenLine xmlns:a14="http://schemas.microsoft.com/office/drawing/2010/main" xmlns="" w="9525">
+                <a14:hiddenLine xmlns="" xmlns:a14="http://schemas.microsoft.com/office/drawing/2010/main" w="9525">
                   <a:solidFill>
                     <a:srgbClr val="000000"/>
                   </a:solidFill>
@@ -2500,7 +2498,7 @@
             </a:ln>
             <a:extLst>
               <a:ext uri="{91240B29-F687-4f45-9708-019B960494DF}">
-                <a14:hiddenLine xmlns:a14="http://schemas.microsoft.com/office/drawing/2010/main" xmlns="" w="9525">
+                <a14:hiddenLine xmlns="" xmlns:a14="http://schemas.microsoft.com/office/drawing/2010/main" w="9525">
                   <a:solidFill>
                     <a:srgbClr val="000000"/>
                   </a:solidFill>
@@ -2562,7 +2560,7 @@
             </a:ln>
             <a:extLst>
               <a:ext uri="{91240B29-F687-4f45-9708-019B960494DF}">
-                <a14:hiddenLine xmlns:a14="http://schemas.microsoft.com/office/drawing/2010/main" xmlns="" w="9525">
+                <a14:hiddenLine xmlns="" xmlns:a14="http://schemas.microsoft.com/office/drawing/2010/main" w="9525">
                   <a:solidFill>
                     <a:srgbClr val="000000"/>
                   </a:solidFill>
@@ -2652,7 +2650,7 @@
             </a:ln>
             <a:extLst>
               <a:ext uri="{91240B29-F687-4f45-9708-019B960494DF}">
-                <a14:hiddenLine xmlns:a14="http://schemas.microsoft.com/office/drawing/2010/main" xmlns="" w="9525">
+                <a14:hiddenLine xmlns="" xmlns:a14="http://schemas.microsoft.com/office/drawing/2010/main" w="9525">
                   <a:solidFill>
                     <a:srgbClr val="000000"/>
                   </a:solidFill>
@@ -2720,7 +2718,7 @@
             </a:ln>
             <a:extLst>
               <a:ext uri="{91240B29-F687-4f45-9708-019B960494DF}">
-                <a14:hiddenLine xmlns:a14="http://schemas.microsoft.com/office/drawing/2010/main" xmlns="" w="9525">
+                <a14:hiddenLine xmlns="" xmlns:a14="http://schemas.microsoft.com/office/drawing/2010/main" w="9525">
                   <a:solidFill>
                     <a:srgbClr val="000000"/>
                   </a:solidFill>
@@ -2782,7 +2780,7 @@
             </a:ln>
             <a:extLst>
               <a:ext uri="{91240B29-F687-4f45-9708-019B960494DF}">
-                <a14:hiddenLine xmlns:a14="http://schemas.microsoft.com/office/drawing/2010/main" xmlns="" w="9525">
+                <a14:hiddenLine xmlns="" xmlns:a14="http://schemas.microsoft.com/office/drawing/2010/main" w="9525">
                   <a:solidFill>
                     <a:srgbClr val="000000"/>
                   </a:solidFill>
@@ -2872,7 +2870,7 @@
             </a:ln>
             <a:extLst>
               <a:ext uri="{91240B29-F687-4f45-9708-019B960494DF}">
-                <a14:hiddenLine xmlns:a14="http://schemas.microsoft.com/office/drawing/2010/main" xmlns="" w="9525">
+                <a14:hiddenLine xmlns="" xmlns:a14="http://schemas.microsoft.com/office/drawing/2010/main" w="9525">
                   <a:solidFill>
                     <a:srgbClr val="000000"/>
                   </a:solidFill>
@@ -2934,7 +2932,7 @@
             </a:ln>
             <a:extLst>
               <a:ext uri="{91240B29-F687-4f45-9708-019B960494DF}">
-                <a14:hiddenLine xmlns:a14="http://schemas.microsoft.com/office/drawing/2010/main" xmlns="" w="9525">
+                <a14:hiddenLine xmlns="" xmlns:a14="http://schemas.microsoft.com/office/drawing/2010/main" w="9525">
                   <a:solidFill>
                     <a:srgbClr val="000000"/>
                   </a:solidFill>
@@ -3024,7 +3022,7 @@
             </a:ln>
             <a:extLst>
               <a:ext uri="{91240B29-F687-4f45-9708-019B960494DF}">
-                <a14:hiddenLine xmlns:a14="http://schemas.microsoft.com/office/drawing/2010/main" xmlns="" w="9525">
+                <a14:hiddenLine xmlns="" xmlns:a14="http://schemas.microsoft.com/office/drawing/2010/main" w="9525">
                   <a:solidFill>
                     <a:srgbClr val="000000"/>
                   </a:solidFill>
@@ -3086,7 +3084,7 @@
             </a:ln>
             <a:extLst>
               <a:ext uri="{91240B29-F687-4f45-9708-019B960494DF}">
-                <a14:hiddenLine xmlns:a14="http://schemas.microsoft.com/office/drawing/2010/main" xmlns="" w="9525">
+                <a14:hiddenLine xmlns="" xmlns:a14="http://schemas.microsoft.com/office/drawing/2010/main" w="9525">
                   <a:solidFill>
                     <a:srgbClr val="000000"/>
                   </a:solidFill>
@@ -3176,7 +3174,7 @@
             </a:ln>
             <a:extLst>
               <a:ext uri="{91240B29-F687-4f45-9708-019B960494DF}">
-                <a14:hiddenLine xmlns:a14="http://schemas.microsoft.com/office/drawing/2010/main" xmlns="" w="9525">
+                <a14:hiddenLine xmlns="" xmlns:a14="http://schemas.microsoft.com/office/drawing/2010/main" w="9525">
                   <a:solidFill>
                     <a:srgbClr val="000000"/>
                   </a:solidFill>
@@ -3210,7 +3208,7 @@
             </a:ln>
             <a:extLst>
               <a:ext uri="{91240B29-F687-4f45-9708-019B960494DF}">
-                <a14:hiddenLine xmlns:a14="http://schemas.microsoft.com/office/drawing/2010/main" xmlns="" w="9525">
+                <a14:hiddenLine xmlns="" xmlns:a14="http://schemas.microsoft.com/office/drawing/2010/main" w="9525">
                   <a:solidFill>
                     <a:srgbClr val="000000"/>
                   </a:solidFill>
@@ -3275,7 +3273,7 @@
             </a:ln>
             <a:extLst>
               <a:ext uri="{91240B29-F687-4f45-9708-019B960494DF}">
-                <a14:hiddenLine xmlns:a14="http://schemas.microsoft.com/office/drawing/2010/main" xmlns="" w="9525">
+                <a14:hiddenLine xmlns="" xmlns:a14="http://schemas.microsoft.com/office/drawing/2010/main" w="9525">
                   <a:solidFill>
                     <a:srgbClr val="000000"/>
                   </a:solidFill>
@@ -3365,7 +3363,7 @@
             </a:ln>
             <a:extLst>
               <a:ext uri="{91240B29-F687-4f45-9708-019B960494DF}">
-                <a14:hiddenLine xmlns:a14="http://schemas.microsoft.com/office/drawing/2010/main" xmlns="" w="9525">
+                <a14:hiddenLine xmlns="" xmlns:a14="http://schemas.microsoft.com/office/drawing/2010/main" w="9525">
                   <a:solidFill>
                     <a:srgbClr val="000000"/>
                   </a:solidFill>
@@ -3427,7 +3425,7 @@
             </a:ln>
             <a:extLst>
               <a:ext uri="{91240B29-F687-4f45-9708-019B960494DF}">
-                <a14:hiddenLine xmlns:a14="http://schemas.microsoft.com/office/drawing/2010/main" xmlns="" w="9525">
+                <a14:hiddenLine xmlns="" xmlns:a14="http://schemas.microsoft.com/office/drawing/2010/main" w="9525">
                   <a:solidFill>
                     <a:srgbClr val="000000"/>
                   </a:solidFill>
@@ -3517,7 +3515,7 @@
             </a:ln>
             <a:extLst>
               <a:ext uri="{91240B29-F687-4f45-9708-019B960494DF}">
-                <a14:hiddenLine xmlns:a14="http://schemas.microsoft.com/office/drawing/2010/main" xmlns="" w="9525">
+                <a14:hiddenLine xmlns="" xmlns:a14="http://schemas.microsoft.com/office/drawing/2010/main" w="9525">
                   <a:solidFill>
                     <a:srgbClr val="000000"/>
                   </a:solidFill>
@@ -3607,7 +3605,7 @@
             </a:ln>
             <a:extLst>
               <a:ext uri="{91240B29-F687-4f45-9708-019B960494DF}">
-                <a14:hiddenLine xmlns:a14="http://schemas.microsoft.com/office/drawing/2010/main" xmlns="" w="9525">
+                <a14:hiddenLine xmlns="" xmlns:a14="http://schemas.microsoft.com/office/drawing/2010/main" w="9525">
                   <a:solidFill>
                     <a:srgbClr val="000000"/>
                   </a:solidFill>
@@ -3672,7 +3670,7 @@
             </a:ln>
             <a:extLst>
               <a:ext uri="{91240B29-F687-4f45-9708-019B960494DF}">
-                <a14:hiddenLine xmlns:a14="http://schemas.microsoft.com/office/drawing/2010/main" xmlns="" w="9525">
+                <a14:hiddenLine xmlns="" xmlns:a14="http://schemas.microsoft.com/office/drawing/2010/main" w="9525">
                   <a:solidFill>
                     <a:srgbClr val="000000"/>
                   </a:solidFill>
@@ -3734,7 +3732,7 @@
             </a:ln>
             <a:extLst>
               <a:ext uri="{91240B29-F687-4f45-9708-019B960494DF}">
-                <a14:hiddenLine xmlns:a14="http://schemas.microsoft.com/office/drawing/2010/main" xmlns="" w="9525">
+                <a14:hiddenLine xmlns="" xmlns:a14="http://schemas.microsoft.com/office/drawing/2010/main" w="9525">
                   <a:solidFill>
                     <a:srgbClr val="000000"/>
                   </a:solidFill>
@@ -3824,7 +3822,7 @@
             </a:ln>
             <a:extLst>
               <a:ext uri="{91240B29-F687-4f45-9708-019B960494DF}">
-                <a14:hiddenLine xmlns:a14="http://schemas.microsoft.com/office/drawing/2010/main" xmlns="" w="9525">
+                <a14:hiddenLine xmlns="" xmlns:a14="http://schemas.microsoft.com/office/drawing/2010/main" w="9525">
                   <a:solidFill>
                     <a:srgbClr val="000000"/>
                   </a:solidFill>
@@ -3914,7 +3912,7 @@
             </a:ln>
             <a:extLst>
               <a:ext uri="{91240B29-F687-4f45-9708-019B960494DF}">
-                <a14:hiddenLine xmlns:a14="http://schemas.microsoft.com/office/drawing/2010/main" xmlns="" w="9525">
+                <a14:hiddenLine xmlns="" xmlns:a14="http://schemas.microsoft.com/office/drawing/2010/main" w="9525">
                   <a:solidFill>
                     <a:srgbClr val="000000"/>
                   </a:solidFill>
@@ -3976,7 +3974,7 @@
             </a:ln>
             <a:extLst>
               <a:ext uri="{91240B29-F687-4f45-9708-019B960494DF}">
-                <a14:hiddenLine xmlns:a14="http://schemas.microsoft.com/office/drawing/2010/main" xmlns="" w="9525">
+                <a14:hiddenLine xmlns="" xmlns:a14="http://schemas.microsoft.com/office/drawing/2010/main" w="9525">
                   <a:solidFill>
                     <a:srgbClr val="000000"/>
                   </a:solidFill>
@@ -4096,7 +4094,7 @@
             </a:ln>
             <a:extLst>
               <a:ext uri="{91240B29-F687-4f45-9708-019B960494DF}">
-                <a14:hiddenLine xmlns:a14="http://schemas.microsoft.com/office/drawing/2010/main" xmlns="" w="9525">
+                <a14:hiddenLine xmlns="" xmlns:a14="http://schemas.microsoft.com/office/drawing/2010/main" w="9525">
                   <a:solidFill>
                     <a:srgbClr val="000000"/>
                   </a:solidFill>
@@ -4164,7 +4162,7 @@
             </a:ln>
             <a:extLst>
               <a:ext uri="{91240B29-F687-4f45-9708-019B960494DF}">
-                <a14:hiddenLine xmlns:a14="http://schemas.microsoft.com/office/drawing/2010/main" xmlns="" w="9525">
+                <a14:hiddenLine xmlns="" xmlns:a14="http://schemas.microsoft.com/office/drawing/2010/main" w="9525">
                   <a:solidFill>
                     <a:srgbClr val="000000"/>
                   </a:solidFill>
@@ -4254,7 +4252,7 @@
             </a:ln>
             <a:extLst>
               <a:ext uri="{91240B29-F687-4f45-9708-019B960494DF}">
-                <a14:hiddenLine xmlns:a14="http://schemas.microsoft.com/office/drawing/2010/main" xmlns="" w="9525">
+                <a14:hiddenLine xmlns="" xmlns:a14="http://schemas.microsoft.com/office/drawing/2010/main" w="9525">
                   <a:solidFill>
                     <a:srgbClr val="000000"/>
                   </a:solidFill>
@@ -9061,7 +9059,7 @@
           <a:noFill/>
           <a:extLst>
             <a:ext uri="{909E8E84-426E-40dd-AFC4-6F175D3DCCD1}">
-              <a14:hiddenFill xmlns:a14="http://schemas.microsoft.com/office/drawing/2010/main" xmlns="">
+              <a14:hiddenFill xmlns="" xmlns:a14="http://schemas.microsoft.com/office/drawing/2010/main">
                 <a:solidFill>
                   <a:srgbClr val="FFFFFF"/>
                 </a:solidFill>
@@ -9135,7 +9133,7 @@
               </a:ln>
               <a:extLst>
                 <a:ext uri="{91240B29-F687-4f45-9708-019B960494DF}">
-                  <a14:hiddenLine xmlns:a14="http://schemas.microsoft.com/office/drawing/2010/main" xmlns="" w="9525">
+                  <a14:hiddenLine xmlns="" xmlns:a14="http://schemas.microsoft.com/office/drawing/2010/main" w="9525">
                     <a:solidFill>
                       <a:srgbClr val="000000"/>
                     </a:solidFill>
@@ -9225,7 +9223,7 @@
               </a:ln>
               <a:extLst>
                 <a:ext uri="{91240B29-F687-4f45-9708-019B960494DF}">
-                  <a14:hiddenLine xmlns:a14="http://schemas.microsoft.com/office/drawing/2010/main" xmlns="" w="9525">
+                  <a14:hiddenLine xmlns="" xmlns:a14="http://schemas.microsoft.com/office/drawing/2010/main" w="9525">
                     <a:solidFill>
                       <a:srgbClr val="000000"/>
                     </a:solidFill>
@@ -9315,7 +9313,7 @@
               </a:ln>
               <a:extLst>
                 <a:ext uri="{91240B29-F687-4f45-9708-019B960494DF}">
-                  <a14:hiddenLine xmlns:a14="http://schemas.microsoft.com/office/drawing/2010/main" xmlns="" w="9525">
+                  <a14:hiddenLine xmlns="" xmlns:a14="http://schemas.microsoft.com/office/drawing/2010/main" w="9525">
                     <a:solidFill>
                       <a:srgbClr val="000000"/>
                     </a:solidFill>
@@ -9377,7 +9375,7 @@
               </a:ln>
               <a:extLst>
                 <a:ext uri="{91240B29-F687-4f45-9708-019B960494DF}">
-                  <a14:hiddenLine xmlns:a14="http://schemas.microsoft.com/office/drawing/2010/main" xmlns="" w="9525">
+                  <a14:hiddenLine xmlns="" xmlns:a14="http://schemas.microsoft.com/office/drawing/2010/main" w="9525">
                     <a:solidFill>
                       <a:srgbClr val="000000"/>
                     </a:solidFill>
@@ -9467,7 +9465,7 @@
               </a:ln>
               <a:extLst>
                 <a:ext uri="{91240B29-F687-4f45-9708-019B960494DF}">
-                  <a14:hiddenLine xmlns:a14="http://schemas.microsoft.com/office/drawing/2010/main" xmlns="" w="9525">
+                  <a14:hiddenLine xmlns="" xmlns:a14="http://schemas.microsoft.com/office/drawing/2010/main" w="9525">
                     <a:solidFill>
                       <a:srgbClr val="000000"/>
                     </a:solidFill>
@@ -9529,7 +9527,7 @@
               </a:ln>
               <a:extLst>
                 <a:ext uri="{91240B29-F687-4f45-9708-019B960494DF}">
-                  <a14:hiddenLine xmlns:a14="http://schemas.microsoft.com/office/drawing/2010/main" xmlns="" w="9525">
+                  <a14:hiddenLine xmlns="" xmlns:a14="http://schemas.microsoft.com/office/drawing/2010/main" w="9525">
                     <a:solidFill>
                       <a:srgbClr val="000000"/>
                     </a:solidFill>
@@ -9591,7 +9589,7 @@
               </a:ln>
               <a:extLst>
                 <a:ext uri="{91240B29-F687-4f45-9708-019B960494DF}">
-                  <a14:hiddenLine xmlns:a14="http://schemas.microsoft.com/office/drawing/2010/main" xmlns="" w="9525">
+                  <a14:hiddenLine xmlns="" xmlns:a14="http://schemas.microsoft.com/office/drawing/2010/main" w="9525">
                     <a:solidFill>
                       <a:srgbClr val="000000"/>
                     </a:solidFill>
@@ -9681,7 +9679,7 @@
               </a:ln>
               <a:extLst>
                 <a:ext uri="{91240B29-F687-4f45-9708-019B960494DF}">
-                  <a14:hiddenLine xmlns:a14="http://schemas.microsoft.com/office/drawing/2010/main" xmlns="" w="9525">
+                  <a14:hiddenLine xmlns="" xmlns:a14="http://schemas.microsoft.com/office/drawing/2010/main" w="9525">
                     <a:solidFill>
                       <a:srgbClr val="000000"/>
                     </a:solidFill>
@@ -9771,7 +9769,7 @@
               </a:ln>
               <a:extLst>
                 <a:ext uri="{91240B29-F687-4f45-9708-019B960494DF}">
-                  <a14:hiddenLine xmlns:a14="http://schemas.microsoft.com/office/drawing/2010/main" xmlns="" w="9525">
+                  <a14:hiddenLine xmlns="" xmlns:a14="http://schemas.microsoft.com/office/drawing/2010/main" w="9525">
                     <a:solidFill>
                       <a:srgbClr val="000000"/>
                     </a:solidFill>
@@ -9833,7 +9831,7 @@
               </a:ln>
               <a:extLst>
                 <a:ext uri="{91240B29-F687-4f45-9708-019B960494DF}">
-                  <a14:hiddenLine xmlns:a14="http://schemas.microsoft.com/office/drawing/2010/main" xmlns="" w="9525">
+                  <a14:hiddenLine xmlns="" xmlns:a14="http://schemas.microsoft.com/office/drawing/2010/main" w="9525">
                     <a:solidFill>
                       <a:srgbClr val="000000"/>
                     </a:solidFill>
@@ -9943,7 +9941,7 @@
               </a:ln>
               <a:extLst>
                 <a:ext uri="{91240B29-F687-4f45-9708-019B960494DF}">
-                  <a14:hiddenLine xmlns:a14="http://schemas.microsoft.com/office/drawing/2010/main" xmlns="" w="9525">
+                  <a14:hiddenLine xmlns="" xmlns:a14="http://schemas.microsoft.com/office/drawing/2010/main" w="9525">
                     <a:solidFill>
                       <a:srgbClr val="000000"/>
                     </a:solidFill>
@@ -10027,7 +10025,7 @@
               </a:ln>
               <a:extLst>
                 <a:ext uri="{91240B29-F687-4f45-9708-019B960494DF}">
-                  <a14:hiddenLine xmlns:a14="http://schemas.microsoft.com/office/drawing/2010/main" xmlns="" w="9525">
+                  <a14:hiddenLine xmlns="" xmlns:a14="http://schemas.microsoft.com/office/drawing/2010/main" w="9525">
                     <a:solidFill>
                       <a:srgbClr val="000000"/>
                     </a:solidFill>
@@ -10089,7 +10087,7 @@
               </a:ln>
               <a:extLst>
                 <a:ext uri="{91240B29-F687-4f45-9708-019B960494DF}">
-                  <a14:hiddenLine xmlns:a14="http://schemas.microsoft.com/office/drawing/2010/main" xmlns="" w="9525">
+                  <a14:hiddenLine xmlns="" xmlns:a14="http://schemas.microsoft.com/office/drawing/2010/main" w="9525">
                     <a:solidFill>
                       <a:srgbClr val="000000"/>
                     </a:solidFill>
@@ -10151,7 +10149,7 @@
               </a:ln>
               <a:extLst>
                 <a:ext uri="{91240B29-F687-4f45-9708-019B960494DF}">
-                  <a14:hiddenLine xmlns:a14="http://schemas.microsoft.com/office/drawing/2010/main" xmlns="" w="9525">
+                  <a14:hiddenLine xmlns="" xmlns:a14="http://schemas.microsoft.com/office/drawing/2010/main" w="9525">
                     <a:solidFill>
                       <a:srgbClr val="000000"/>
                     </a:solidFill>
@@ -10241,7 +10239,7 @@
               </a:ln>
               <a:extLst>
                 <a:ext uri="{91240B29-F687-4f45-9708-019B960494DF}">
-                  <a14:hiddenLine xmlns:a14="http://schemas.microsoft.com/office/drawing/2010/main" xmlns="" w="9525">
+                  <a14:hiddenLine xmlns="" xmlns:a14="http://schemas.microsoft.com/office/drawing/2010/main" w="9525">
                     <a:solidFill>
                       <a:srgbClr val="000000"/>
                     </a:solidFill>
@@ -10275,7 +10273,7 @@
               </a:ln>
               <a:extLst>
                 <a:ext uri="{91240B29-F687-4f45-9708-019B960494DF}">
-                  <a14:hiddenLine xmlns:a14="http://schemas.microsoft.com/office/drawing/2010/main" xmlns="" w="9525">
+                  <a14:hiddenLine xmlns="" xmlns:a14="http://schemas.microsoft.com/office/drawing/2010/main" w="9525">
                     <a:solidFill>
                       <a:srgbClr val="000000"/>
                     </a:solidFill>
@@ -10340,7 +10338,7 @@
               </a:ln>
               <a:extLst>
                 <a:ext uri="{91240B29-F687-4f45-9708-019B960494DF}">
-                  <a14:hiddenLine xmlns:a14="http://schemas.microsoft.com/office/drawing/2010/main" xmlns="" w="9525">
+                  <a14:hiddenLine xmlns="" xmlns:a14="http://schemas.microsoft.com/office/drawing/2010/main" w="9525">
                     <a:solidFill>
                       <a:srgbClr val="000000"/>
                     </a:solidFill>
@@ -10430,7 +10428,7 @@
               </a:ln>
               <a:extLst>
                 <a:ext uri="{91240B29-F687-4f45-9708-019B960494DF}">
-                  <a14:hiddenLine xmlns:a14="http://schemas.microsoft.com/office/drawing/2010/main" xmlns="" w="9525">
+                  <a14:hiddenLine xmlns="" xmlns:a14="http://schemas.microsoft.com/office/drawing/2010/main" w="9525">
                     <a:solidFill>
                       <a:srgbClr val="000000"/>
                     </a:solidFill>
@@ -10492,7 +10490,7 @@
               </a:ln>
               <a:extLst>
                 <a:ext uri="{91240B29-F687-4f45-9708-019B960494DF}">
-                  <a14:hiddenLine xmlns:a14="http://schemas.microsoft.com/office/drawing/2010/main" xmlns="" w="9525">
+                  <a14:hiddenLine xmlns="" xmlns:a14="http://schemas.microsoft.com/office/drawing/2010/main" w="9525">
                     <a:solidFill>
                       <a:srgbClr val="000000"/>
                     </a:solidFill>
@@ -10582,7 +10580,7 @@
               </a:ln>
               <a:extLst>
                 <a:ext uri="{91240B29-F687-4f45-9708-019B960494DF}">
-                  <a14:hiddenLine xmlns:a14="http://schemas.microsoft.com/office/drawing/2010/main" xmlns="" w="9525">
+                  <a14:hiddenLine xmlns="" xmlns:a14="http://schemas.microsoft.com/office/drawing/2010/main" w="9525">
                     <a:solidFill>
                       <a:srgbClr val="000000"/>
                     </a:solidFill>
@@ -10647,7 +10645,7 @@
               </a:ln>
               <a:extLst>
                 <a:ext uri="{91240B29-F687-4f45-9708-019B960494DF}">
-                  <a14:hiddenLine xmlns:a14="http://schemas.microsoft.com/office/drawing/2010/main" xmlns="" w="9525">
+                  <a14:hiddenLine xmlns="" xmlns:a14="http://schemas.microsoft.com/office/drawing/2010/main" w="9525">
                     <a:solidFill>
                       <a:srgbClr val="000000"/>
                     </a:solidFill>
@@ -10709,7 +10707,7 @@
               </a:ln>
               <a:extLst>
                 <a:ext uri="{91240B29-F687-4f45-9708-019B960494DF}">
-                  <a14:hiddenLine xmlns:a14="http://schemas.microsoft.com/office/drawing/2010/main" xmlns="" w="9525">
+                  <a14:hiddenLine xmlns="" xmlns:a14="http://schemas.microsoft.com/office/drawing/2010/main" w="9525">
                     <a:solidFill>
                       <a:srgbClr val="000000"/>
                     </a:solidFill>
@@ -10799,7 +10797,7 @@
               </a:ln>
               <a:extLst>
                 <a:ext uri="{91240B29-F687-4f45-9708-019B960494DF}">
-                  <a14:hiddenLine xmlns:a14="http://schemas.microsoft.com/office/drawing/2010/main" xmlns="" w="9525">
+                  <a14:hiddenLine xmlns="" xmlns:a14="http://schemas.microsoft.com/office/drawing/2010/main" w="9525">
                     <a:solidFill>
                       <a:srgbClr val="000000"/>
                     </a:solidFill>
@@ -10889,7 +10887,7 @@
               </a:ln>
               <a:extLst>
                 <a:ext uri="{91240B29-F687-4f45-9708-019B960494DF}">
-                  <a14:hiddenLine xmlns:a14="http://schemas.microsoft.com/office/drawing/2010/main" xmlns="" w="9525">
+                  <a14:hiddenLine xmlns="" xmlns:a14="http://schemas.microsoft.com/office/drawing/2010/main" w="9525">
                     <a:solidFill>
                       <a:srgbClr val="000000"/>
                     </a:solidFill>
@@ -10954,7 +10952,7 @@
               </a:ln>
               <a:extLst>
                 <a:ext uri="{91240B29-F687-4f45-9708-019B960494DF}">
-                  <a14:hiddenLine xmlns:a14="http://schemas.microsoft.com/office/drawing/2010/main" xmlns="" w="9525">
+                  <a14:hiddenLine xmlns="" xmlns:a14="http://schemas.microsoft.com/office/drawing/2010/main" w="9525">
                     <a:solidFill>
                       <a:srgbClr val="000000"/>
                     </a:solidFill>
@@ -11074,7 +11072,7 @@
               </a:ln>
               <a:extLst>
                 <a:ext uri="{91240B29-F687-4f45-9708-019B960494DF}">
-                  <a14:hiddenLine xmlns:a14="http://schemas.microsoft.com/office/drawing/2010/main" xmlns="" w="9525">
+                  <a14:hiddenLine xmlns="" xmlns:a14="http://schemas.microsoft.com/office/drawing/2010/main" w="9525">
                     <a:solidFill>
                       <a:srgbClr val="000000"/>
                     </a:solidFill>
@@ -11172,7 +11170,7 @@
               </a:ln>
               <a:extLst>
                 <a:ext uri="{91240B29-F687-4f45-9708-019B960494DF}">
-                  <a14:hiddenLine xmlns:a14="http://schemas.microsoft.com/office/drawing/2010/main" xmlns="" w="9525">
+                  <a14:hiddenLine xmlns="" xmlns:a14="http://schemas.microsoft.com/office/drawing/2010/main" w="9525">
                     <a:solidFill>
                       <a:srgbClr val="000000"/>
                     </a:solidFill>
@@ -11287,7 +11285,7 @@
               </a:ln>
               <a:extLst>
                 <a:ext uri="{91240B29-F687-4f45-9708-019B960494DF}">
-                  <a14:hiddenLine xmlns:a14="http://schemas.microsoft.com/office/drawing/2010/main" xmlns="" w="9525">
+                  <a14:hiddenLine xmlns="" xmlns:a14="http://schemas.microsoft.com/office/drawing/2010/main" w="9525">
                     <a:solidFill>
                       <a:srgbClr val="000000"/>
                     </a:solidFill>
@@ -11377,7 +11375,7 @@
               </a:ln>
               <a:extLst>
                 <a:ext uri="{91240B29-F687-4f45-9708-019B960494DF}">
-                  <a14:hiddenLine xmlns:a14="http://schemas.microsoft.com/office/drawing/2010/main" xmlns="" w="9525">
+                  <a14:hiddenLine xmlns="" xmlns:a14="http://schemas.microsoft.com/office/drawing/2010/main" w="9525">
                     <a:solidFill>
                       <a:srgbClr val="000000"/>
                     </a:solidFill>
@@ -11442,7 +11440,7 @@
               </a:ln>
               <a:extLst>
                 <a:ext uri="{91240B29-F687-4f45-9708-019B960494DF}">
-                  <a14:hiddenLine xmlns:a14="http://schemas.microsoft.com/office/drawing/2010/main" xmlns="" w="9525">
+                  <a14:hiddenLine xmlns="" xmlns:a14="http://schemas.microsoft.com/office/drawing/2010/main" w="9525">
                     <a:solidFill>
                       <a:srgbClr val="000000"/>
                     </a:solidFill>
@@ -11532,7 +11530,7 @@
               </a:ln>
               <a:extLst>
                 <a:ext uri="{91240B29-F687-4f45-9708-019B960494DF}">
-                  <a14:hiddenLine xmlns:a14="http://schemas.microsoft.com/office/drawing/2010/main" xmlns="" w="9525">
+                  <a14:hiddenLine xmlns="" xmlns:a14="http://schemas.microsoft.com/office/drawing/2010/main" w="9525">
                     <a:solidFill>
                       <a:srgbClr val="000000"/>
                     </a:solidFill>
@@ -11600,7 +11598,7 @@
               </a:ln>
               <a:extLst>
                 <a:ext uri="{91240B29-F687-4f45-9708-019B960494DF}">
-                  <a14:hiddenLine xmlns:a14="http://schemas.microsoft.com/office/drawing/2010/main" xmlns="" w="9525">
+                  <a14:hiddenLine xmlns="" xmlns:a14="http://schemas.microsoft.com/office/drawing/2010/main" w="9525">
                     <a:solidFill>
                       <a:srgbClr val="000000"/>
                     </a:solidFill>
@@ -11690,7 +11688,7 @@
               </a:ln>
               <a:extLst>
                 <a:ext uri="{91240B29-F687-4f45-9708-019B960494DF}">
-                  <a14:hiddenLine xmlns:a14="http://schemas.microsoft.com/office/drawing/2010/main" xmlns="" w="9525">
+                  <a14:hiddenLine xmlns="" xmlns:a14="http://schemas.microsoft.com/office/drawing/2010/main" w="9525">
                     <a:solidFill>
                       <a:srgbClr val="000000"/>
                     </a:solidFill>
@@ -11758,7 +11756,7 @@
               </a:ln>
               <a:extLst>
                 <a:ext uri="{91240B29-F687-4f45-9708-019B960494DF}">
-                  <a14:hiddenLine xmlns:a14="http://schemas.microsoft.com/office/drawing/2010/main" xmlns="" w="9525">
+                  <a14:hiddenLine xmlns="" xmlns:a14="http://schemas.microsoft.com/office/drawing/2010/main" w="9525">
                     <a:solidFill>
                       <a:srgbClr val="000000"/>
                     </a:solidFill>
@@ -11848,7 +11846,7 @@
               </a:ln>
               <a:extLst>
                 <a:ext uri="{91240B29-F687-4f45-9708-019B960494DF}">
-                  <a14:hiddenLine xmlns:a14="http://schemas.microsoft.com/office/drawing/2010/main" xmlns="" w="9525">
+                  <a14:hiddenLine xmlns="" xmlns:a14="http://schemas.microsoft.com/office/drawing/2010/main" w="9525">
                     <a:solidFill>
                       <a:srgbClr val="000000"/>
                     </a:solidFill>
@@ -11882,7 +11880,7 @@
               </a:ln>
               <a:extLst>
                 <a:ext uri="{91240B29-F687-4f45-9708-019B960494DF}">
-                  <a14:hiddenLine xmlns:a14="http://schemas.microsoft.com/office/drawing/2010/main" xmlns="" w="9525">
+                  <a14:hiddenLine xmlns="" xmlns:a14="http://schemas.microsoft.com/office/drawing/2010/main" w="9525">
                     <a:solidFill>
                       <a:srgbClr val="000000"/>
                     </a:solidFill>
@@ -12582,7 +12580,7 @@
         <p:spPr/>
         <p:txBody>
           <a:bodyPr>
-            <a:normAutofit fontScale="70000" lnSpcReduction="20000"/>
+            <a:normAutofit fontScale="55000" lnSpcReduction="20000"/>
           </a:bodyPr>
           <a:lstStyle/>
           <a:p>
@@ -12664,7 +12662,10 @@
             <a:endParaRPr lang="en-US" dirty="0"/>
           </a:p>
           <a:p>
-            <a:endParaRPr lang="en-US" dirty="0"/>
+            <a:r>
+              <a:rPr lang="en-US" dirty="0"/>
+              <a:t>Slight optimizations – operating point</a:t>
+            </a:r>
           </a:p>
         </p:txBody>
       </p:sp>
@@ -12682,36 +12683,6 @@
 </file>
 
 <file path=ppt/slides/slide3.xml><?xml version="1.0" encoding="utf-8"?>
-<p:sld xmlns:a="http://schemas.openxmlformats.org/drawingml/2006/main" xmlns:r="http://schemas.openxmlformats.org/officeDocument/2006/relationships" xmlns:p="http://schemas.openxmlformats.org/presentationml/2006/main">
-  <p:cSld>
-    <p:spTree>
-      <p:nvGrpSpPr>
-        <p:cNvPr id="1" name=""/>
-        <p:cNvGrpSpPr/>
-        <p:nvPr/>
-      </p:nvGrpSpPr>
-      <p:grpSpPr>
-        <a:xfrm>
-          <a:off x="0" y="0"/>
-          <a:ext cx="0" cy="0"/>
-          <a:chOff x="0" y="0"/>
-          <a:chExt cx="0" cy="0"/>
-        </a:xfrm>
-      </p:grpSpPr>
-    </p:spTree>
-    <p:extLst>
-      <p:ext uri="{BB962C8B-B14F-4D97-AF65-F5344CB8AC3E}">
-        <p14:creationId xmlns:p14="http://schemas.microsoft.com/office/powerpoint/2010/main" val="2030369395"/>
-      </p:ext>
-    </p:extLst>
-  </p:cSld>
-  <p:clrMapOvr>
-    <a:masterClrMapping/>
-  </p:clrMapOvr>
-</p:sld>
-</file>
-
-<file path=ppt/slides/slide4.xml><?xml version="1.0" encoding="utf-8"?>
 <p:sld xmlns:a="http://schemas.openxmlformats.org/drawingml/2006/main" xmlns:r="http://schemas.openxmlformats.org/officeDocument/2006/relationships" xmlns:p="http://schemas.openxmlformats.org/presentationml/2006/main">
   <p:cSld>
     <p:spTree>
@@ -12749,7 +12720,10 @@
           <a:bodyPr/>
           <a:lstStyle/>
           <a:p>
-            <a:endParaRPr lang="en-US" dirty="0"/>
+            <a:r>
+              <a:rPr lang="en-US" dirty="0"/>
+              <a:t>NEXT STEPS:</a:t>
+            </a:r>
           </a:p>
         </p:txBody>
       </p:sp>
@@ -12772,11 +12746,89 @@
         <p:spPr/>
         <p:txBody>
           <a:bodyPr>
-            <a:normAutofit/>
+            <a:normAutofit fontScale="70000" lnSpcReduction="20000"/>
           </a:bodyPr>
           <a:lstStyle/>
           <a:p>
-            <a:endParaRPr lang="en-US" dirty="0"/>
+            <a:r>
+              <a:rPr lang="en-US" dirty="0"/>
+              <a:t>Still need to add </a:t>
+            </a:r>
+            <a:r>
+              <a:rPr lang="en-US" dirty="0" err="1"/>
+              <a:t>subcircuit</a:t>
+            </a:r>
+            <a:r>
+              <a:rPr lang="en-US" dirty="0"/>
+              <a:t> parsing to make this useful for large, complex circuits</a:t>
+            </a:r>
+          </a:p>
+          <a:p>
+            <a:r>
+              <a:rPr lang="en-US" dirty="0"/>
+              <a:t>Reduce size of G matrix from N^2 (plan to look into </a:t>
+            </a:r>
+            <a:r>
+              <a:rPr lang="en-US" dirty="0" err="1"/>
+              <a:t>cuSparse</a:t>
+            </a:r>
+            <a:r>
+              <a:rPr lang="en-US" dirty="0"/>
+              <a:t>)</a:t>
+            </a:r>
+          </a:p>
+          <a:p>
+            <a:r>
+              <a:rPr lang="en-US" dirty="0"/>
+              <a:t>Optimize for parallelization, speed improvements</a:t>
+            </a:r>
+          </a:p>
+          <a:p>
+            <a:pPr lvl="1"/>
+            <a:r>
+              <a:rPr lang="en-US" dirty="0"/>
+              <a:t>Transient sim. dependent on prev. solutions, but:</a:t>
+            </a:r>
+          </a:p>
+          <a:p>
+            <a:pPr lvl="1"/>
+            <a:r>
+              <a:rPr lang="en-US" dirty="0"/>
+              <a:t>Solver may be optimized to further reduce memory copies,</a:t>
+            </a:r>
+          </a:p>
+          <a:p>
+            <a:pPr lvl="1"/>
+            <a:r>
+              <a:rPr lang="en-US" dirty="0"/>
+              <a:t>Parallelize matrix population</a:t>
+            </a:r>
+          </a:p>
+          <a:p>
+            <a:pPr lvl="1"/>
+            <a:r>
+              <a:rPr lang="en-US" dirty="0"/>
+              <a:t>Reduce memory footprint</a:t>
+            </a:r>
+          </a:p>
+          <a:p>
+            <a:r>
+              <a:rPr lang="en-US" dirty="0"/>
+              <a:t>Make transistor model more robust:</a:t>
+            </a:r>
+          </a:p>
+          <a:p>
+            <a:pPr lvl="1"/>
+            <a:r>
+              <a:rPr lang="en-US" dirty="0"/>
+              <a:t>Inclusion of more parameters and effects</a:t>
+            </a:r>
+          </a:p>
+          <a:p>
+            <a:r>
+              <a:rPr lang="en-US" dirty="0"/>
+              <a:t>GUI/User interaction improvements</a:t>
+            </a:r>
           </a:p>
         </p:txBody>
       </p:sp>
@@ -12784,6 +12836,72 @@
     <p:extLst>
       <p:ext uri="{BB962C8B-B14F-4D97-AF65-F5344CB8AC3E}">
         <p14:creationId xmlns:p14="http://schemas.microsoft.com/office/powerpoint/2010/main" val="636787039"/>
+      </p:ext>
+    </p:extLst>
+  </p:cSld>
+  <p:clrMapOvr>
+    <a:masterClrMapping/>
+  </p:clrMapOvr>
+</p:sld>
+</file>
+
+<file path=ppt/slides/slide4.xml><?xml version="1.0" encoding="utf-8"?>
+<p:sld xmlns:a="http://schemas.openxmlformats.org/drawingml/2006/main" xmlns:r="http://schemas.openxmlformats.org/officeDocument/2006/relationships" xmlns:p="http://schemas.openxmlformats.org/presentationml/2006/main">
+  <p:cSld>
+    <p:spTree>
+      <p:nvGrpSpPr>
+        <p:cNvPr id="1" name=""/>
+        <p:cNvGrpSpPr/>
+        <p:nvPr/>
+      </p:nvGrpSpPr>
+      <p:grpSpPr>
+        <a:xfrm>
+          <a:off x="0" y="0"/>
+          <a:ext cx="0" cy="0"/>
+          <a:chOff x="0" y="0"/>
+          <a:chExt cx="0" cy="0"/>
+        </a:xfrm>
+      </p:grpSpPr>
+      <p:sp>
+        <p:nvSpPr>
+          <p:cNvPr id="2" name="Title 1">
+            <a:extLst>
+              <a:ext uri="{FF2B5EF4-FFF2-40B4-BE49-F238E27FC236}">
+                <a16:creationId xmlns:a16="http://schemas.microsoft.com/office/drawing/2014/main" id="{A2F1E851-E5AE-464B-9E46-6B2093D9D8EB}"/>
+              </a:ext>
+            </a:extLst>
+          </p:cNvPr>
+          <p:cNvSpPr>
+            <a:spLocks noGrp="1"/>
+          </p:cNvSpPr>
+          <p:nvPr>
+            <p:ph type="title"/>
+          </p:nvPr>
+        </p:nvSpPr>
+        <p:spPr>
+          <a:xfrm>
+            <a:off x="1143001" y="2689715"/>
+            <a:ext cx="9905998" cy="1478570"/>
+          </a:xfrm>
+        </p:spPr>
+        <p:txBody>
+          <a:bodyPr>
+            <a:normAutofit/>
+          </a:bodyPr>
+          <a:lstStyle/>
+          <a:p>
+            <a:pPr algn="ctr"/>
+            <a:r>
+              <a:rPr lang="en-US" sz="9600" dirty="0"/>
+              <a:t>DEMO</a:t>
+            </a:r>
+          </a:p>
+        </p:txBody>
+      </p:sp>
+    </p:spTree>
+    <p:extLst>
+      <p:ext uri="{BB962C8B-B14F-4D97-AF65-F5344CB8AC3E}">
+        <p14:creationId xmlns:p14="http://schemas.microsoft.com/office/powerpoint/2010/main" val="2030369395"/>
       </p:ext>
     </p:extLst>
   </p:cSld>
@@ -12810,174 +12928,46 @@
           <a:chExt cx="0" cy="0"/>
         </a:xfrm>
       </p:grpSpPr>
+      <p:pic>
+        <p:nvPicPr>
+          <p:cNvPr id="3" name="Picture 2">
+            <a:extLst>
+              <a:ext uri="{FF2B5EF4-FFF2-40B4-BE49-F238E27FC236}">
+                <a16:creationId xmlns:a16="http://schemas.microsoft.com/office/drawing/2014/main" id="{E0B8D091-3FB4-4F10-B3B1-5A21163214C5}"/>
+              </a:ext>
+            </a:extLst>
+          </p:cNvPr>
+          <p:cNvPicPr>
+            <a:picLocks noChangeAspect="1"/>
+          </p:cNvPicPr>
+          <p:nvPr/>
+        </p:nvPicPr>
+        <p:blipFill>
+          <a:blip r:embed="rId2">
+            <a:extLst>
+              <a:ext uri="{28A0092B-C50C-407E-A947-70E740481C1C}">
+                <a14:useLocalDpi xmlns:a14="http://schemas.microsoft.com/office/drawing/2010/main" val="0"/>
+              </a:ext>
+            </a:extLst>
+          </a:blip>
+          <a:stretch>
+            <a:fillRect/>
+          </a:stretch>
+        </p:blipFill>
+        <p:spPr>
+          <a:xfrm>
+            <a:off x="2483807" y="1219008"/>
+            <a:ext cx="7224386" cy="4419983"/>
+          </a:xfrm>
+          <a:prstGeom prst="rect">
+            <a:avLst/>
+          </a:prstGeom>
+        </p:spPr>
+      </p:pic>
     </p:spTree>
     <p:extLst>
       <p:ext uri="{BB962C8B-B14F-4D97-AF65-F5344CB8AC3E}">
         <p14:creationId xmlns:p14="http://schemas.microsoft.com/office/powerpoint/2010/main" val="5450685"/>
-      </p:ext>
-    </p:extLst>
-  </p:cSld>
-  <p:clrMapOvr>
-    <a:masterClrMapping/>
-  </p:clrMapOvr>
-</p:sld>
-</file>
-
-<file path=ppt/slides/slide6.xml><?xml version="1.0" encoding="utf-8"?>
-<p:sld xmlns:a="http://schemas.openxmlformats.org/drawingml/2006/main" xmlns:r="http://schemas.openxmlformats.org/officeDocument/2006/relationships" xmlns:p="http://schemas.openxmlformats.org/presentationml/2006/main">
-  <p:cSld>
-    <p:spTree>
-      <p:nvGrpSpPr>
-        <p:cNvPr id="1" name=""/>
-        <p:cNvGrpSpPr/>
-        <p:nvPr/>
-      </p:nvGrpSpPr>
-      <p:grpSpPr>
-        <a:xfrm>
-          <a:off x="0" y="0"/>
-          <a:ext cx="0" cy="0"/>
-          <a:chOff x="0" y="0"/>
-          <a:chExt cx="0" cy="0"/>
-        </a:xfrm>
-      </p:grpSpPr>
-      <p:sp>
-        <p:nvSpPr>
-          <p:cNvPr id="2" name="Title 1">
-            <a:extLst>
-              <a:ext uri="{FF2B5EF4-FFF2-40B4-BE49-F238E27FC236}">
-                <a16:creationId xmlns:a16="http://schemas.microsoft.com/office/drawing/2014/main" id="{C02F1890-AAE1-42CD-AF63-7A9BF6B145C9}"/>
-              </a:ext>
-            </a:extLst>
-          </p:cNvPr>
-          <p:cNvSpPr>
-            <a:spLocks noGrp="1"/>
-          </p:cNvSpPr>
-          <p:nvPr>
-            <p:ph type="title"/>
-          </p:nvPr>
-        </p:nvSpPr>
-        <p:spPr/>
-        <p:txBody>
-          <a:bodyPr/>
-          <a:lstStyle/>
-          <a:p>
-            <a:endParaRPr lang="en-US" dirty="0"/>
-          </a:p>
-        </p:txBody>
-      </p:sp>
-      <p:sp>
-        <p:nvSpPr>
-          <p:cNvPr id="3" name="Content Placeholder 2">
-            <a:extLst>
-              <a:ext uri="{FF2B5EF4-FFF2-40B4-BE49-F238E27FC236}">
-                <a16:creationId xmlns:a16="http://schemas.microsoft.com/office/drawing/2014/main" id="{E0BBE1FD-9353-4D3C-95F7-E7F5B3B4632E}"/>
-              </a:ext>
-            </a:extLst>
-          </p:cNvPr>
-          <p:cNvSpPr>
-            <a:spLocks noGrp="1"/>
-          </p:cNvSpPr>
-          <p:nvPr>
-            <p:ph idx="1"/>
-          </p:nvPr>
-        </p:nvSpPr>
-        <p:spPr/>
-        <p:txBody>
-          <a:bodyPr>
-            <a:normAutofit/>
-          </a:bodyPr>
-          <a:lstStyle/>
-          <a:p>
-            <a:endParaRPr lang="en-US" dirty="0"/>
-          </a:p>
-        </p:txBody>
-      </p:sp>
-    </p:spTree>
-    <p:extLst>
-      <p:ext uri="{BB962C8B-B14F-4D97-AF65-F5344CB8AC3E}">
-        <p14:creationId xmlns:p14="http://schemas.microsoft.com/office/powerpoint/2010/main" val="2226966861"/>
-      </p:ext>
-    </p:extLst>
-  </p:cSld>
-  <p:clrMapOvr>
-    <a:masterClrMapping/>
-  </p:clrMapOvr>
-</p:sld>
-</file>
-
-<file path=ppt/slides/slide7.xml><?xml version="1.0" encoding="utf-8"?>
-<p:sld xmlns:a="http://schemas.openxmlformats.org/drawingml/2006/main" xmlns:r="http://schemas.openxmlformats.org/officeDocument/2006/relationships" xmlns:p="http://schemas.openxmlformats.org/presentationml/2006/main">
-  <p:cSld>
-    <p:spTree>
-      <p:nvGrpSpPr>
-        <p:cNvPr id="1" name=""/>
-        <p:cNvGrpSpPr/>
-        <p:nvPr/>
-      </p:nvGrpSpPr>
-      <p:grpSpPr>
-        <a:xfrm>
-          <a:off x="0" y="0"/>
-          <a:ext cx="0" cy="0"/>
-          <a:chOff x="0" y="0"/>
-          <a:chExt cx="0" cy="0"/>
-        </a:xfrm>
-      </p:grpSpPr>
-      <p:sp>
-        <p:nvSpPr>
-          <p:cNvPr id="2" name="Title 1">
-            <a:extLst>
-              <a:ext uri="{FF2B5EF4-FFF2-40B4-BE49-F238E27FC236}">
-                <a16:creationId xmlns:a16="http://schemas.microsoft.com/office/drawing/2014/main" id="{A84417CB-84A5-43D6-976B-65D4F3C0B327}"/>
-              </a:ext>
-            </a:extLst>
-          </p:cNvPr>
-          <p:cNvSpPr>
-            <a:spLocks noGrp="1"/>
-          </p:cNvSpPr>
-          <p:nvPr>
-            <p:ph type="title"/>
-          </p:nvPr>
-        </p:nvSpPr>
-        <p:spPr/>
-        <p:txBody>
-          <a:bodyPr/>
-          <a:lstStyle/>
-          <a:p>
-            <a:endParaRPr lang="en-US" dirty="0"/>
-          </a:p>
-        </p:txBody>
-      </p:sp>
-      <p:sp>
-        <p:nvSpPr>
-          <p:cNvPr id="3" name="Content Placeholder 2">
-            <a:extLst>
-              <a:ext uri="{FF2B5EF4-FFF2-40B4-BE49-F238E27FC236}">
-                <a16:creationId xmlns:a16="http://schemas.microsoft.com/office/drawing/2014/main" id="{0E2AF32F-6F36-4E96-8243-41E7456E0A2C}"/>
-              </a:ext>
-            </a:extLst>
-          </p:cNvPr>
-          <p:cNvSpPr>
-            <a:spLocks noGrp="1"/>
-          </p:cNvSpPr>
-          <p:nvPr>
-            <p:ph idx="1"/>
-          </p:nvPr>
-        </p:nvSpPr>
-        <p:spPr/>
-        <p:txBody>
-          <a:bodyPr>
-            <a:normAutofit/>
-          </a:bodyPr>
-          <a:lstStyle/>
-          <a:p>
-            <a:endParaRPr lang="en-US" dirty="0"/>
-          </a:p>
-        </p:txBody>
-      </p:sp>
-    </p:spTree>
-    <p:extLst>
-      <p:ext uri="{BB962C8B-B14F-4D97-AF65-F5344CB8AC3E}">
-        <p14:creationId xmlns:p14="http://schemas.microsoft.com/office/powerpoint/2010/main" val="1205014278"/>
       </p:ext>
     </p:extLst>
   </p:cSld>

</xml_diff>